<commit_message>
added abstract and finisched pp
</commit_message>
<xml_diff>
--- a/SKA-Days/pp.pptx
+++ b/SKA-Days/pp.pptx
@@ -17,13 +17,10 @@
     <p:sldId id="266" r:id="rId11"/>
     <p:sldId id="272" r:id="rId12"/>
     <p:sldId id="263" r:id="rId13"/>
-    <p:sldId id="267" r:id="rId14"/>
+    <p:sldId id="276" r:id="rId14"/>
     <p:sldId id="271" r:id="rId15"/>
-    <p:sldId id="277" r:id="rId16"/>
-    <p:sldId id="276" r:id="rId17"/>
-    <p:sldId id="275" r:id="rId18"/>
-    <p:sldId id="270" r:id="rId19"/>
-    <p:sldId id="269" r:id="rId20"/>
+    <p:sldId id="270" r:id="rId16"/>
+    <p:sldId id="269" r:id="rId17"/>
   </p:sldIdLst>
   <p:sldSz cx="12192000" cy="6858000"/>
   <p:notesSz cx="6858000" cy="9144000"/>
@@ -139,11 +136,8 @@
             <p14:sldId id="266"/>
             <p14:sldId id="272"/>
             <p14:sldId id="263"/>
-            <p14:sldId id="267"/>
+            <p14:sldId id="276"/>
             <p14:sldId id="271"/>
-            <p14:sldId id="277"/>
-            <p14:sldId id="276"/>
-            <p14:sldId id="275"/>
             <p14:sldId id="270"/>
             <p14:sldId id="269"/>
           </p14:sldIdLst>
@@ -499,7 +493,7 @@
               <c:strCache>
                 <c:ptCount val="1"/>
                 <c:pt idx="0">
-                  <c:v>IDG</c:v>
+                  <c:v>IDG (.netcore)</c:v>
                 </c:pt>
               </c:strCache>
             </c:strRef>
@@ -518,7 +512,7 @@
           </c:val>
           <c:extLst>
             <c:ext xmlns:c16="http://schemas.microsoft.com/office/drawing/2014/chart" uri="{C3380CC4-5D6E-409C-BE32-E72D297353CC}">
-              <c16:uniqueId val="{00000000-48F6-41DC-8C90-FC2FFE1AEBDA}"/>
+              <c16:uniqueId val="{00000000-E0B5-41A3-A4C0-0574AA6B5B5B}"/>
             </c:ext>
           </c:extLst>
         </c:ser>
@@ -552,7 +546,7 @@
               <c:strCache>
                 <c:ptCount val="1"/>
                 <c:pt idx="0">
-                  <c:v>IDG</c:v>
+                  <c:v>IDG (.netcore)</c:v>
                 </c:pt>
               </c:strCache>
             </c:strRef>
@@ -571,7 +565,7 @@
           </c:val>
           <c:extLst>
             <c:ext xmlns:c16="http://schemas.microsoft.com/office/drawing/2014/chart" uri="{C3380CC4-5D6E-409C-BE32-E72D297353CC}">
-              <c16:uniqueId val="{00000001-48F6-41DC-8C90-FC2FFE1AEBDA}"/>
+              <c16:uniqueId val="{00000001-E0B5-41A3-A4C0-0574AA6B5B5B}"/>
             </c:ext>
           </c:extLst>
         </c:ser>
@@ -686,6 +680,7 @@
               </a:p>
             </c:rich>
           </c:tx>
+          <c:layout/>
           <c:overlay val="0"/>
           <c:spPr>
             <a:noFill/>
@@ -760,6 +755,7 @@
     </c:plotArea>
     <c:legend>
       <c:legendPos val="b"/>
+      <c:layout/>
       <c:overlay val="0"/>
       <c:spPr>
         <a:noFill/>
@@ -867,7 +863,7 @@
               <c:strCache>
                 <c:ptCount val="2"/>
                 <c:pt idx="0">
-                  <c:v>IDG</c:v>
+                  <c:v>IDG (.netcore)</c:v>
                 </c:pt>
                 <c:pt idx="1">
                   <c:v>CD Deconvolution</c:v>
@@ -892,7 +888,7 @@
           </c:val>
           <c:extLst>
             <c:ext xmlns:c16="http://schemas.microsoft.com/office/drawing/2014/chart" uri="{C3380CC4-5D6E-409C-BE32-E72D297353CC}">
-              <c16:uniqueId val="{00000000-4CD0-4E4F-9922-14A533F91855}"/>
+              <c16:uniqueId val="{00000000-8515-4F22-8226-96010FAB00DC}"/>
             </c:ext>
           </c:extLst>
         </c:ser>
@@ -926,7 +922,7 @@
               <c:strCache>
                 <c:ptCount val="2"/>
                 <c:pt idx="0">
-                  <c:v>IDG</c:v>
+                  <c:v>IDG (.netcore)</c:v>
                 </c:pt>
                 <c:pt idx="1">
                   <c:v>CD Deconvolution</c:v>
@@ -951,7 +947,7 @@
           </c:val>
           <c:extLst>
             <c:ext xmlns:c16="http://schemas.microsoft.com/office/drawing/2014/chart" uri="{C3380CC4-5D6E-409C-BE32-E72D297353CC}">
-              <c16:uniqueId val="{00000001-4CD0-4E4F-9922-14A533F91855}"/>
+              <c16:uniqueId val="{00000001-8515-4F22-8226-96010FAB00DC}"/>
             </c:ext>
           </c:extLst>
         </c:ser>
@@ -1066,6 +1062,7 @@
               </a:p>
             </c:rich>
           </c:tx>
+          <c:layout/>
           <c:overlay val="0"/>
           <c:spPr>
             <a:noFill/>
@@ -1140,6 +1137,7 @@
     </c:plotArea>
     <c:legend>
       <c:legendPos val="b"/>
+      <c:layout/>
       <c:overlay val="0"/>
       <c:spPr>
         <a:noFill/>
@@ -2956,7 +2954,7 @@
           <a:p>
             <a:fld id="{9D44239A-C583-499D-A70F-E9EF0D5B777A}" type="datetimeFigureOut">
               <a:rPr lang="en-GB" smtClean="0"/>
-              <a:t>17/06/2019</a:t>
+              <a:t>19/06/2019</a:t>
             </a:fld>
             <a:endParaRPr lang="en-GB"/>
           </a:p>
@@ -3126,7 +3124,7 @@
           <a:p>
             <a:fld id="{9D44239A-C583-499D-A70F-E9EF0D5B777A}" type="datetimeFigureOut">
               <a:rPr lang="en-GB" smtClean="0"/>
-              <a:t>17/06/2019</a:t>
+              <a:t>19/06/2019</a:t>
             </a:fld>
             <a:endParaRPr lang="en-GB"/>
           </a:p>
@@ -3306,7 +3304,7 @@
           <a:p>
             <a:fld id="{9D44239A-C583-499D-A70F-E9EF0D5B777A}" type="datetimeFigureOut">
               <a:rPr lang="en-GB" smtClean="0"/>
-              <a:t>17/06/2019</a:t>
+              <a:t>19/06/2019</a:t>
             </a:fld>
             <a:endParaRPr lang="en-GB"/>
           </a:p>
@@ -3476,7 +3474,7 @@
           <a:p>
             <a:fld id="{9D44239A-C583-499D-A70F-E9EF0D5B777A}" type="datetimeFigureOut">
               <a:rPr lang="en-GB" smtClean="0"/>
-              <a:t>17/06/2019</a:t>
+              <a:t>19/06/2019</a:t>
             </a:fld>
             <a:endParaRPr lang="en-GB"/>
           </a:p>
@@ -3722,7 +3720,7 @@
           <a:p>
             <a:fld id="{9D44239A-C583-499D-A70F-E9EF0D5B777A}" type="datetimeFigureOut">
               <a:rPr lang="en-GB" smtClean="0"/>
-              <a:t>17/06/2019</a:t>
+              <a:t>19/06/2019</a:t>
             </a:fld>
             <a:endParaRPr lang="en-GB"/>
           </a:p>
@@ -3954,7 +3952,7 @@
           <a:p>
             <a:fld id="{9D44239A-C583-499D-A70F-E9EF0D5B777A}" type="datetimeFigureOut">
               <a:rPr lang="en-GB" smtClean="0"/>
-              <a:t>17/06/2019</a:t>
+              <a:t>19/06/2019</a:t>
             </a:fld>
             <a:endParaRPr lang="en-GB"/>
           </a:p>
@@ -4321,7 +4319,7 @@
           <a:p>
             <a:fld id="{9D44239A-C583-499D-A70F-E9EF0D5B777A}" type="datetimeFigureOut">
               <a:rPr lang="en-GB" smtClean="0"/>
-              <a:t>17/06/2019</a:t>
+              <a:t>19/06/2019</a:t>
             </a:fld>
             <a:endParaRPr lang="en-GB"/>
           </a:p>
@@ -4439,7 +4437,7 @@
           <a:p>
             <a:fld id="{9D44239A-C583-499D-A70F-E9EF0D5B777A}" type="datetimeFigureOut">
               <a:rPr lang="en-GB" smtClean="0"/>
-              <a:t>17/06/2019</a:t>
+              <a:t>19/06/2019</a:t>
             </a:fld>
             <a:endParaRPr lang="en-GB"/>
           </a:p>
@@ -4534,7 +4532,7 @@
           <a:p>
             <a:fld id="{9D44239A-C583-499D-A70F-E9EF0D5B777A}" type="datetimeFigureOut">
               <a:rPr lang="en-GB" smtClean="0"/>
-              <a:t>17/06/2019</a:t>
+              <a:t>19/06/2019</a:t>
             </a:fld>
             <a:endParaRPr lang="en-GB"/>
           </a:p>
@@ -4811,7 +4809,7 @@
           <a:p>
             <a:fld id="{9D44239A-C583-499D-A70F-E9EF0D5B777A}" type="datetimeFigureOut">
               <a:rPr lang="en-GB" smtClean="0"/>
-              <a:t>17/06/2019</a:t>
+              <a:t>19/06/2019</a:t>
             </a:fld>
             <a:endParaRPr lang="en-GB"/>
           </a:p>
@@ -5064,7 +5062,7 @@
           <a:p>
             <a:fld id="{9D44239A-C583-499D-A70F-E9EF0D5B777A}" type="datetimeFigureOut">
               <a:rPr lang="en-GB" smtClean="0"/>
-              <a:t>17/06/2019</a:t>
+              <a:t>19/06/2019</a:t>
             </a:fld>
             <a:endParaRPr lang="en-GB"/>
           </a:p>
@@ -5277,7 +5275,7 @@
           <a:p>
             <a:fld id="{9D44239A-C583-499D-A70F-E9EF0D5B777A}" type="datetimeFigureOut">
               <a:rPr lang="en-GB" smtClean="0"/>
-              <a:t>17/06/2019</a:t>
+              <a:t>19/06/2019</a:t>
             </a:fld>
             <a:endParaRPr lang="en-GB"/>
           </a:p>
@@ -5806,202 +5804,130 @@
           </a:p>
         </p:txBody>
       </p:sp>
-      <mc:AlternateContent xmlns:mc="http://schemas.openxmlformats.org/markup-compatibility/2006" xmlns:a14="http://schemas.microsoft.com/office/drawing/2010/main">
-        <mc:Choice Requires="a14">
-          <p:sp>
-            <p:nvSpPr>
-              <p:cNvPr id="3" name="Inhaltsplatzhalter 2"/>
-              <p:cNvSpPr>
-                <a:spLocks noGrp="1"/>
-              </p:cNvSpPr>
-              <p:nvPr>
-                <p:ph idx="1"/>
-              </p:nvPr>
-            </p:nvSpPr>
-            <p:spPr/>
-            <p:txBody>
-              <a:bodyPr>
-                <a:normAutofit/>
-              </a:bodyPr>
-              <a:lstStyle/>
-              <a:p>
-                <a:pPr marL="0" indent="0">
-                  <a:buNone/>
-                </a:pPr>
-                <a:r>
-                  <a:rPr lang="en-GB" i="1" dirty="0" smtClean="0">
-                    <a:latin typeface="Bell MT" panose="02020503060305020303" pitchFamily="18" charset="0"/>
-                  </a:rPr>
-                  <a:t>residuals </a:t>
-                </a:r>
-                <a:r>
-                  <a:rPr lang="en-GB" i="1" dirty="0">
-                    <a:latin typeface="Bell MT" panose="02020503060305020303" pitchFamily="18" charset="0"/>
-                  </a:rPr>
-                  <a:t>= dirty image</a:t>
-                </a:r>
-              </a:p>
-              <a:p>
-                <a:pPr marL="514350" indent="-514350">
-                  <a:buFont typeface="+mj-lt"/>
-                  <a:buAutoNum type="arabicPeriod"/>
-                </a:pPr>
-                <a:r>
-                  <a:rPr lang="en-GB" dirty="0" smtClean="0"/>
-                  <a:t>Find </a:t>
-                </a:r>
-                <a:r>
-                  <a:rPr lang="en-GB" dirty="0"/>
-                  <a:t>the maximum pixel of </a:t>
-                </a:r>
-                <a:r>
-                  <a:rPr lang="en-GB" dirty="0" smtClean="0"/>
-                  <a:t>[</a:t>
-                </a:r>
-                <a:r>
-                  <a:rPr lang="en-GB" i="1" dirty="0">
-                    <a:latin typeface="Bell MT" panose="02020503060305020303" pitchFamily="18" charset="0"/>
-                  </a:rPr>
-                  <a:t>residuals</a:t>
-                </a:r>
-                <a:r>
-                  <a:rPr lang="en-GB" dirty="0" smtClean="0"/>
-                  <a:t> </a:t>
-                </a:r>
-                <a14:m>
-                  <m:oMath xmlns:m="http://schemas.openxmlformats.org/officeDocument/2006/math">
-                    <m:r>
-                      <a:rPr lang="en-GB" i="1" smtClean="0">
-                        <a:latin typeface="Cambria Math" panose="02040503050406030204" pitchFamily="18" charset="0"/>
-                      </a:rPr>
-                      <m:t>⋆</m:t>
-                    </m:r>
-                  </m:oMath>
-                </a14:m>
-                <a:r>
-                  <a:rPr lang="en-GB" dirty="0" smtClean="0"/>
-                  <a:t> </a:t>
-                </a:r>
-                <a:r>
-                  <a:rPr lang="en-GB" i="1" dirty="0" smtClean="0">
-                    <a:latin typeface="Bell MT" panose="02020503060305020303" pitchFamily="18" charset="0"/>
-                  </a:rPr>
-                  <a:t>PSF</a:t>
-                </a:r>
-                <a:r>
-                  <a:rPr lang="en-GB" dirty="0" smtClean="0"/>
-                  <a:t>]</a:t>
-                </a:r>
-                <a:endParaRPr lang="en-GB" dirty="0"/>
-              </a:p>
-              <a:p>
-                <a:pPr marL="514350" lvl="0" indent="-514350">
-                  <a:buFont typeface="+mj-lt"/>
-                  <a:buAutoNum type="arabicPeriod"/>
-                </a:pPr>
-                <a:r>
-                  <a:rPr lang="en-GB" dirty="0" smtClean="0"/>
-                  <a:t>Fix all other pixels, calculate </a:t>
-                </a:r>
-                <a:r>
-                  <a:rPr lang="en-GB" dirty="0"/>
-                  <a:t>the optimum value for this pixel (optimum of a parabola)</a:t>
-                </a:r>
-              </a:p>
-              <a:p>
-                <a:pPr marL="514350" lvl="0" indent="-514350">
-                  <a:buFont typeface="+mj-lt"/>
-                  <a:buAutoNum type="arabicPeriod"/>
-                </a:pPr>
-                <a:r>
-                  <a:rPr lang="en-GB" dirty="0"/>
-                  <a:t>Update </a:t>
-                </a:r>
-                <a:r>
-                  <a:rPr lang="en-GB" i="1" dirty="0" smtClean="0">
-                    <a:latin typeface="Bell MT" panose="02020503060305020303" pitchFamily="18" charset="0"/>
-                  </a:rPr>
-                  <a:t>residuals</a:t>
-                </a:r>
-                <a:endParaRPr lang="en-GB" i="1" dirty="0" smtClean="0"/>
-              </a:p>
-              <a:p>
-                <a:pPr marL="514350" indent="-514350">
-                  <a:buFont typeface="+mj-lt"/>
-                  <a:buAutoNum type="arabicPeriod"/>
-                </a:pPr>
-                <a:r>
-                  <a:rPr lang="en-GB" dirty="0" smtClean="0"/>
-                  <a:t>Repeat until </a:t>
-                </a:r>
-                <a:r>
-                  <a:rPr lang="en-GB" i="1" dirty="0" smtClean="0">
-                    <a:latin typeface="Bell MT" panose="02020503060305020303" pitchFamily="18" charset="0"/>
-                  </a:rPr>
-                  <a:t>residuals</a:t>
-                </a:r>
-                <a:r>
-                  <a:rPr lang="en-GB" dirty="0" smtClean="0"/>
-                  <a:t> are </a:t>
-                </a:r>
-                <a:r>
-                  <a:rPr lang="en-GB" dirty="0"/>
-                  <a:t>small</a:t>
-                </a:r>
-              </a:p>
-              <a:p>
-                <a:pPr marL="0" indent="0">
-                  <a:buNone/>
-                </a:pPr>
-                <a:endParaRPr lang="en-GB" dirty="0"/>
-              </a:p>
-              <a:p>
-                <a:pPr marL="0" indent="0">
-                  <a:buNone/>
-                </a:pPr>
-                <a:r>
-                  <a:rPr lang="en-GB" dirty="0" smtClean="0"/>
-                  <a:t>More sophisticated CD variants, but that is the core algorithm</a:t>
-                </a:r>
-                <a:endParaRPr lang="en-GB" dirty="0"/>
-              </a:p>
-            </p:txBody>
-          </p:sp>
-        </mc:Choice>
-        <mc:Fallback xmlns="">
-          <p:sp>
-            <p:nvSpPr>
-              <p:cNvPr id="3" name="Inhaltsplatzhalter 2"/>
-              <p:cNvSpPr>
-                <a:spLocks noGrp="1" noRot="1" noChangeAspect="1" noMove="1" noResize="1" noEditPoints="1" noAdjustHandles="1" noChangeArrowheads="1" noChangeShapeType="1" noTextEdit="1"/>
-              </p:cNvSpPr>
-              <p:nvPr>
-                <p:ph idx="1"/>
-              </p:nvPr>
-            </p:nvSpPr>
-            <p:spPr>
-              <a:blipFill>
-                <a:blip r:embed="rId2"/>
-                <a:stretch>
-                  <a:fillRect l="-1217" t="-2241"/>
-                </a:stretch>
-              </a:blipFill>
-            </p:spPr>
-            <p:txBody>
-              <a:bodyPr/>
-              <a:lstStyle/>
-              <a:p>
-                <a:r>
-                  <a:rPr lang="en-GB">
-                    <a:noFill/>
-                  </a:rPr>
-                  <a:t> </a:t>
-                </a:r>
-              </a:p>
-            </p:txBody>
-          </p:sp>
-        </mc:Fallback>
-      </mc:AlternateContent>
+      <p:sp>
+        <p:nvSpPr>
+          <p:cNvPr id="3" name="Inhaltsplatzhalter 2"/>
+          <p:cNvSpPr>
+            <a:spLocks noGrp="1"/>
+          </p:cNvSpPr>
+          <p:nvPr>
+            <p:ph idx="1"/>
+          </p:nvPr>
+        </p:nvSpPr>
+        <p:spPr/>
+        <p:txBody>
+          <a:bodyPr>
+            <a:normAutofit/>
+          </a:bodyPr>
+          <a:lstStyle/>
+          <a:p>
+            <a:pPr marL="0" indent="0">
+              <a:buNone/>
+            </a:pPr>
+            <a:r>
+              <a:rPr lang="en-GB" i="1" dirty="0" smtClean="0">
+                <a:latin typeface="Bell MT" panose="02020503060305020303" pitchFamily="18" charset="0"/>
+              </a:rPr>
+              <a:t>residuals </a:t>
+            </a:r>
+            <a:r>
+              <a:rPr lang="en-GB" i="1" dirty="0">
+                <a:latin typeface="Bell MT" panose="02020503060305020303" pitchFamily="18" charset="0"/>
+              </a:rPr>
+              <a:t>= dirty image</a:t>
+            </a:r>
+          </a:p>
+          <a:p>
+            <a:pPr marL="514350" indent="-514350">
+              <a:buFont typeface="+mj-lt"/>
+              <a:buAutoNum type="arabicPeriod"/>
+            </a:pPr>
+            <a:r>
+              <a:rPr lang="en-GB" dirty="0" smtClean="0"/>
+              <a:t>Search pixel with the value that can be modified the most </a:t>
+            </a:r>
+          </a:p>
+          <a:p>
+            <a:pPr marL="514350" indent="-514350">
+              <a:buFont typeface="+mj-lt"/>
+              <a:buAutoNum type="arabicPeriod"/>
+            </a:pPr>
+            <a:r>
+              <a:rPr lang="en-GB" dirty="0" smtClean="0"/>
+              <a:t>Calculate </a:t>
+            </a:r>
+            <a:r>
+              <a:rPr lang="en-GB" dirty="0"/>
+              <a:t>the optimum value for this </a:t>
+            </a:r>
+            <a:r>
+              <a:rPr lang="en-GB" dirty="0" smtClean="0"/>
+              <a:t>pixel independently of all other pixels (optimum </a:t>
+            </a:r>
+            <a:r>
+              <a:rPr lang="en-GB" dirty="0"/>
+              <a:t>of a parabola)</a:t>
+            </a:r>
+          </a:p>
+          <a:p>
+            <a:pPr marL="514350" lvl="0" indent="-514350">
+              <a:buFont typeface="+mj-lt"/>
+              <a:buAutoNum type="arabicPeriod"/>
+            </a:pPr>
+            <a:r>
+              <a:rPr lang="en-GB" dirty="0"/>
+              <a:t>Update </a:t>
+            </a:r>
+            <a:r>
+              <a:rPr lang="en-GB" i="1" dirty="0" smtClean="0">
+                <a:latin typeface="Bell MT" panose="02020503060305020303" pitchFamily="18" charset="0"/>
+              </a:rPr>
+              <a:t>residuals</a:t>
+            </a:r>
+            <a:endParaRPr lang="en-GB" i="1" dirty="0" smtClean="0"/>
+          </a:p>
+          <a:p>
+            <a:pPr marL="514350" indent="-514350">
+              <a:buFont typeface="+mj-lt"/>
+              <a:buAutoNum type="arabicPeriod"/>
+            </a:pPr>
+            <a:r>
+              <a:rPr lang="en-GB" dirty="0" smtClean="0"/>
+              <a:t>Repeat until </a:t>
+            </a:r>
+            <a:r>
+              <a:rPr lang="en-GB" i="1" dirty="0" smtClean="0">
+                <a:latin typeface="Bell MT" panose="02020503060305020303" pitchFamily="18" charset="0"/>
+              </a:rPr>
+              <a:t>residuals</a:t>
+            </a:r>
+            <a:r>
+              <a:rPr lang="en-GB" dirty="0"/>
+              <a:t> </a:t>
+            </a:r>
+            <a:r>
+              <a:rPr lang="en-GB" dirty="0" smtClean="0"/>
+              <a:t>are small</a:t>
+            </a:r>
+          </a:p>
+          <a:p>
+            <a:pPr marL="0" indent="0">
+              <a:buNone/>
+            </a:pPr>
+            <a:endParaRPr lang="en-GB" dirty="0"/>
+          </a:p>
+          <a:p>
+            <a:pPr marL="0" indent="0">
+              <a:buNone/>
+            </a:pPr>
+            <a:r>
+              <a:rPr lang="en-GB" dirty="0" smtClean="0"/>
+              <a:t>More sophisticated CD methods, but that is the core algorithm</a:t>
+            </a:r>
+            <a:endParaRPr lang="en-GB" dirty="0"/>
+          </a:p>
+        </p:txBody>
+      </p:sp>
     </p:spTree>
     <p:extLst>
       <p:ext uri="{BB962C8B-B14F-4D97-AF65-F5344CB8AC3E}">
@@ -6136,16 +6062,13 @@
                   <a:schemeClr val="bg1"/>
                 </a:solidFill>
               </a:rPr>
-              <a:t>Find maximum </a:t>
-            </a:r>
-            <a:r>
-              <a:rPr lang="en-GB" dirty="0">
-                <a:solidFill>
-                  <a:schemeClr val="bg1"/>
-                </a:solidFill>
-              </a:rPr>
-              <a:t>local pixel</a:t>
-            </a:r>
+              <a:t>Search local pixel with the value that can be modified the most</a:t>
+            </a:r>
+            <a:endParaRPr lang="en-GB" dirty="0">
+              <a:solidFill>
+                <a:schemeClr val="bg1"/>
+              </a:solidFill>
+            </a:endParaRPr>
           </a:p>
           <a:p>
             <a:pPr marL="514350" indent="-514350">
@@ -6158,7 +6081,7 @@
                   <a:schemeClr val="bg1"/>
                 </a:solidFill>
               </a:rPr>
-              <a:t>Find maximum global </a:t>
+              <a:t>Find best global </a:t>
             </a:r>
             <a:r>
               <a:rPr lang="en-GB" dirty="0">
@@ -6209,7 +6132,7 @@
                   <a:schemeClr val="bg1"/>
                 </a:solidFill>
               </a:rPr>
-              <a:t>Update dirty image patch</a:t>
+              <a:t>Update local residuals</a:t>
             </a:r>
           </a:p>
           <a:p>
@@ -6350,21 +6273,21 @@
       </p:sp>
       <p:graphicFrame>
         <p:nvGraphicFramePr>
-          <p:cNvPr id="5" name="Diagramm 4"/>
+          <p:cNvPr id="7" name="Diagramm 6"/>
           <p:cNvGraphicFramePr>
             <a:graphicFrameLocks/>
           </p:cNvGraphicFramePr>
           <p:nvPr>
             <p:extLst>
               <p:ext uri="{D42A27DB-BD31-4B8C-83A1-F6EECF244321}">
-                <p14:modId xmlns:p14="http://schemas.microsoft.com/office/powerpoint/2010/main" val="1598798415"/>
+                <p14:modId xmlns:p14="http://schemas.microsoft.com/office/powerpoint/2010/main" val="3206787467"/>
               </p:ext>
             </p:extLst>
           </p:nvPr>
         </p:nvGraphicFramePr>
         <p:xfrm>
-          <a:off x="1513186" y="1416264"/>
-          <a:ext cx="8501965" cy="4916574"/>
+          <a:off x="2249365" y="1911960"/>
+          <a:ext cx="8336573" cy="4567971"/>
         </p:xfrm>
         <a:graphic>
           <a:graphicData uri="http://schemas.openxmlformats.org/drawingml/2006/chart">
@@ -6426,7 +6349,18 @@
           <a:p>
             <a:r>
               <a:rPr lang="en-GB" dirty="0" smtClean="0"/>
-              <a:t>Distributed gridding + deconvolution</a:t>
+              <a:t/>
+            </a:r>
+            <a:br>
+              <a:rPr lang="en-GB" dirty="0" smtClean="0"/>
+            </a:br>
+            <a:r>
+              <a:rPr lang="en-GB" dirty="0" smtClean="0"/>
+              <a:t>Baseline distributed gridding </a:t>
+            </a:r>
+            <a:r>
+              <a:rPr lang="en-GB" dirty="0" smtClean="0"/>
+              <a:t>+ deconvolution</a:t>
             </a:r>
             <a:endParaRPr lang="en-GB" dirty="0"/>
           </a:p>
@@ -6444,27 +6378,44 @@
         </p:nvSpPr>
         <p:spPr/>
         <p:txBody>
-          <a:bodyPr/>
+          <a:bodyPr>
+            <a:normAutofit/>
+          </a:bodyPr>
           <a:lstStyle/>
           <a:p>
             <a:r>
               <a:rPr lang="en-GB" dirty="0" smtClean="0"/>
-              <a:t>Distributed gridding: More effective with more input data</a:t>
-            </a:r>
-          </a:p>
-          <a:p>
+              <a:t>Distributed </a:t>
+            </a:r>
             <a:r>
               <a:rPr lang="en-GB" dirty="0" smtClean="0"/>
-              <a:t>Distributed deconvolution: Communication is difficult </a:t>
+              <a:t>gridding: More effective with a lot of input data</a:t>
+            </a:r>
+          </a:p>
+          <a:p>
+            <a:r>
+              <a:rPr lang="en-GB" dirty="0" smtClean="0"/>
+              <a:t>Distributed deconvolution: </a:t>
             </a:r>
           </a:p>
           <a:p>
             <a:pPr lvl="1"/>
             <a:r>
               <a:rPr lang="en-GB" dirty="0" smtClean="0"/>
-              <a:t>But we have more communication efficient CD algorithms to explore:</a:t>
-            </a:r>
-            <a:endParaRPr lang="en-GB" dirty="0"/>
+              <a:t>We </a:t>
+            </a:r>
+            <a:r>
+              <a:rPr lang="en-GB" dirty="0"/>
+              <a:t>have more communication efficient CD </a:t>
+            </a:r>
+            <a:r>
+              <a:rPr lang="en-GB" dirty="0" smtClean="0"/>
+              <a:t>methods </a:t>
+            </a:r>
+            <a:r>
+              <a:rPr lang="en-GB" dirty="0"/>
+              <a:t>to explore:</a:t>
+            </a:r>
           </a:p>
           <a:p>
             <a:pPr lvl="2"/>
@@ -6472,18 +6423,19 @@
               <a:rPr lang="en-GB" dirty="0" smtClean="0"/>
               <a:t>Shotgun</a:t>
             </a:r>
+            <a:endParaRPr lang="en-GB" dirty="0"/>
           </a:p>
           <a:p>
             <a:pPr lvl="2"/>
             <a:r>
-              <a:rPr lang="en-GB" dirty="0" smtClean="0"/>
+              <a:rPr lang="en-GB" dirty="0"/>
               <a:t>PCDM</a:t>
             </a:r>
           </a:p>
           <a:p>
             <a:pPr lvl="2"/>
             <a:r>
-              <a:rPr lang="en-GB" dirty="0" smtClean="0"/>
+              <a:rPr lang="en-GB" dirty="0"/>
               <a:t>Hydra</a:t>
             </a:r>
           </a:p>
@@ -6495,19 +6447,70 @@
             </a:r>
           </a:p>
           <a:p>
+            <a:pPr lvl="1"/>
             <a:r>
               <a:rPr lang="en-GB" dirty="0" smtClean="0"/>
-              <a:t>GPU accelerated IDG </a:t>
+              <a:t>CD on the GPU: </a:t>
+            </a:r>
+            <a:r>
+              <a:rPr lang="en-GB" dirty="0" err="1"/>
+              <a:t>McGaffin</a:t>
             </a:r>
             <a:r>
               <a:rPr lang="en-GB" dirty="0"/>
-              <a:t>and </a:t>
-            </a:r>
-            <a:r>
-              <a:rPr lang="en-GB" dirty="0" smtClean="0"/>
-              <a:t>CD exist</a:t>
-            </a:r>
-            <a:endParaRPr lang="en-GB" dirty="0"/>
+              <a:t>, Madison </a:t>
+            </a:r>
+            <a:r>
+              <a:rPr lang="en-GB" dirty="0" err="1"/>
+              <a:t>Gray</a:t>
+            </a:r>
+            <a:r>
+              <a:rPr lang="en-GB" dirty="0"/>
+              <a:t>, and Jeffrey A. </a:t>
+            </a:r>
+            <a:r>
+              <a:rPr lang="en-GB" dirty="0" err="1"/>
+              <a:t>Fessler</a:t>
+            </a:r>
+            <a:r>
+              <a:rPr lang="en-GB" dirty="0"/>
+              <a:t>. "Edge-preserving image </a:t>
+            </a:r>
+            <a:r>
+              <a:rPr lang="en-GB" dirty="0" err="1"/>
+              <a:t>denoising</a:t>
+            </a:r>
+            <a:r>
+              <a:rPr lang="en-GB" dirty="0"/>
+              <a:t> via group coordinate descent on the GPU." </a:t>
+            </a:r>
+            <a:r>
+              <a:rPr lang="en-GB" i="1" dirty="0">
+                <a:solidFill>
+                  <a:schemeClr val="bg1">
+                    <a:lumMod val="50000"/>
+                  </a:schemeClr>
+                </a:solidFill>
+              </a:rPr>
+              <a:t>IEEE Transactions on Image Processing</a:t>
+            </a:r>
+            <a:r>
+              <a:rPr lang="en-GB" dirty="0">
+                <a:solidFill>
+                  <a:schemeClr val="bg1">
+                    <a:lumMod val="50000"/>
+                  </a:schemeClr>
+                </a:solidFill>
+              </a:rPr>
+              <a:t> 24.4 (2015): 1273-1281.</a:t>
+            </a:r>
+            <a:endParaRPr lang="en-GB" dirty="0" smtClean="0">
+              <a:solidFill>
+                <a:schemeClr val="bg1">
+                  <a:lumMod val="50000"/>
+                </a:schemeClr>
+              </a:solidFill>
+            </a:endParaRPr>
           </a:p>
           <a:p>
             <a:endParaRPr lang="en-GB" dirty="0"/>
@@ -6517,13 +6520,20 @@
     </p:spTree>
     <p:extLst>
       <p:ext uri="{BB962C8B-B14F-4D97-AF65-F5344CB8AC3E}">
-        <p14:creationId xmlns:p14="http://schemas.microsoft.com/office/powerpoint/2010/main" val="1075553389"/>
+        <p14:creationId xmlns:p14="http://schemas.microsoft.com/office/powerpoint/2010/main" val="1876525649"/>
       </p:ext>
     </p:extLst>
   </p:cSld>
   <p:clrMapOvr>
     <a:masterClrMapping/>
   </p:clrMapOvr>
+  <p:timing>
+    <p:tnLst>
+      <p:par>
+        <p:cTn id="1" dur="indefinite" restart="never" nodeType="tmRoot"/>
+      </p:par>
+    </p:tnLst>
+  </p:timing>
 </p:sld>
 </file>
 
@@ -6596,6 +6606,13 @@
   <p:clrMapOvr>
     <a:masterClrMapping/>
   </p:clrMapOvr>
+  <p:timing>
+    <p:tnLst>
+      <p:par>
+        <p:cTn id="1" dur="indefinite" restart="never" nodeType="tmRoot"/>
+      </p:par>
+    </p:tnLst>
+  </p:timing>
 </p:sld>
 </file>
 
@@ -6631,7 +6648,15 @@
           <a:bodyPr/>
           <a:lstStyle/>
           <a:p>
-            <a:endParaRPr lang="en-GB"/>
+            <a:r>
+              <a:rPr lang="en-GB" dirty="0" smtClean="0"/>
+              <a:t>Comparison CLEAN with </a:t>
+            </a:r>
+            <a:r>
+              <a:rPr lang="en-GB" dirty="0" err="1" smtClean="0"/>
+              <a:t>CD+ElasticNet</a:t>
+            </a:r>
+            <a:endParaRPr lang="en-GB" dirty="0"/>
           </a:p>
         </p:txBody>
       </p:sp>
@@ -6650,533 +6675,13 @@
           <a:bodyPr/>
           <a:lstStyle/>
           <a:p>
-            <a:endParaRPr lang="en-GB"/>
-          </a:p>
-        </p:txBody>
-      </p:sp>
-    </p:spTree>
-    <p:extLst>
-      <p:ext uri="{BB962C8B-B14F-4D97-AF65-F5344CB8AC3E}">
-        <p14:creationId xmlns:p14="http://schemas.microsoft.com/office/powerpoint/2010/main" val="616443316"/>
-      </p:ext>
-    </p:extLst>
-  </p:cSld>
-  <p:clrMapOvr>
-    <a:masterClrMapping/>
-  </p:clrMapOvr>
-</p:sld>
-</file>
-
-<file path=ppt/slides/slide16.xml><?xml version="1.0" encoding="utf-8"?>
-<p:sld xmlns:a="http://schemas.openxmlformats.org/drawingml/2006/main" xmlns:r="http://schemas.openxmlformats.org/officeDocument/2006/relationships" xmlns:p="http://schemas.openxmlformats.org/presentationml/2006/main">
-  <p:cSld>
-    <p:spTree>
-      <p:nvGrpSpPr>
-        <p:cNvPr id="1" name=""/>
-        <p:cNvGrpSpPr/>
-        <p:nvPr/>
-      </p:nvGrpSpPr>
-      <p:grpSpPr>
-        <a:xfrm>
-          <a:off x="0" y="0"/>
-          <a:ext cx="0" cy="0"/>
-          <a:chOff x="0" y="0"/>
-          <a:chExt cx="0" cy="0"/>
-        </a:xfrm>
-      </p:grpSpPr>
-      <p:sp>
-        <p:nvSpPr>
-          <p:cNvPr id="2" name="Titel 1"/>
-          <p:cNvSpPr>
-            <a:spLocks noGrp="1"/>
-          </p:cNvSpPr>
-          <p:nvPr>
-            <p:ph type="title"/>
-          </p:nvPr>
-        </p:nvSpPr>
-        <p:spPr/>
-        <p:txBody>
-          <a:bodyPr/>
-          <a:lstStyle/>
-          <a:p>
             <a:r>
               <a:rPr lang="en-GB" dirty="0" smtClean="0"/>
-              <a:t>(Alternative </a:t>
+              <a:t>Noise Regularization: </a:t>
             </a:r>
             <a:r>
               <a:rPr lang="en-GB" dirty="0" err="1" smtClean="0"/>
-              <a:t>zu</a:t>
-            </a:r>
-            <a:r>
-              <a:rPr lang="en-GB" dirty="0" smtClean="0"/>
-              <a:t> </a:t>
-            </a:r>
-            <a:r>
-              <a:rPr lang="en-GB" dirty="0" err="1" smtClean="0"/>
-              <a:t>Folie</a:t>
-            </a:r>
-            <a:r>
-              <a:rPr lang="en-GB" dirty="0" smtClean="0"/>
-              <a:t> 13)</a:t>
-            </a:r>
-            <a:br>
-              <a:rPr lang="en-GB" dirty="0" smtClean="0"/>
-            </a:br>
-            <a:r>
-              <a:rPr lang="en-GB" dirty="0" smtClean="0"/>
-              <a:t>Distributed gridding + deconvolution</a:t>
-            </a:r>
-            <a:endParaRPr lang="en-GB" dirty="0"/>
-          </a:p>
-        </p:txBody>
-      </p:sp>
-      <p:sp>
-        <p:nvSpPr>
-          <p:cNvPr id="3" name="Inhaltsplatzhalter 2"/>
-          <p:cNvSpPr>
-            <a:spLocks noGrp="1"/>
-          </p:cNvSpPr>
-          <p:nvPr>
-            <p:ph idx="1"/>
-          </p:nvPr>
-        </p:nvSpPr>
-        <p:spPr/>
-        <p:txBody>
-          <a:bodyPr>
-            <a:normAutofit/>
-          </a:bodyPr>
-          <a:lstStyle/>
-          <a:p>
-            <a:r>
-              <a:rPr lang="en-GB" dirty="0" smtClean="0"/>
-              <a:t>Distributed gridding: </a:t>
-            </a:r>
-          </a:p>
-          <a:p>
-            <a:pPr lvl="1"/>
-            <a:r>
-              <a:rPr lang="en-GB" dirty="0" smtClean="0"/>
-              <a:t>More effective with more input data</a:t>
-            </a:r>
-          </a:p>
-          <a:p>
-            <a:pPr lvl="1"/>
-            <a:r>
-              <a:rPr lang="en-GB" dirty="0" smtClean="0"/>
-              <a:t>Bandwidth limited, well-suited for super computers</a:t>
-            </a:r>
-          </a:p>
-          <a:p>
-            <a:r>
-              <a:rPr lang="en-GB" dirty="0" smtClean="0"/>
-              <a:t>Distributed deconvolution: </a:t>
-            </a:r>
-          </a:p>
-          <a:p>
-            <a:pPr lvl="1"/>
-            <a:r>
-              <a:rPr lang="en-GB" dirty="0" smtClean="0"/>
-              <a:t>Latency limited, not well-suited for super computers</a:t>
-            </a:r>
-          </a:p>
-          <a:p>
-            <a:pPr lvl="1"/>
-            <a:r>
-              <a:rPr lang="en-GB" dirty="0"/>
-              <a:t>W</a:t>
-            </a:r>
-            <a:r>
-              <a:rPr lang="en-GB" dirty="0" smtClean="0"/>
-              <a:t>e </a:t>
-            </a:r>
-            <a:r>
-              <a:rPr lang="en-GB" dirty="0"/>
-              <a:t>have more communication efficient CD algorithms to explore:</a:t>
-            </a:r>
-          </a:p>
-          <a:p>
-            <a:pPr lvl="2"/>
-            <a:r>
-              <a:rPr lang="en-GB" dirty="0" smtClean="0"/>
-              <a:t>Shotgun</a:t>
-            </a:r>
-            <a:endParaRPr lang="en-GB" dirty="0"/>
-          </a:p>
-          <a:p>
-            <a:pPr lvl="2"/>
-            <a:r>
-              <a:rPr lang="en-GB" dirty="0"/>
-              <a:t>PCDM</a:t>
-            </a:r>
-          </a:p>
-          <a:p>
-            <a:pPr lvl="2"/>
-            <a:r>
-              <a:rPr lang="en-GB" dirty="0"/>
-              <a:t>Hydra</a:t>
-            </a:r>
-          </a:p>
-          <a:p>
-            <a:pPr lvl="2"/>
-            <a:r>
-              <a:rPr lang="en-GB" dirty="0" smtClean="0"/>
-              <a:t>…</a:t>
-            </a:r>
-          </a:p>
-          <a:p>
-            <a:pPr lvl="1"/>
-            <a:r>
-              <a:rPr lang="en-GB" dirty="0" smtClean="0"/>
-              <a:t>GPU accelerated CD variants exist</a:t>
-            </a:r>
-          </a:p>
-          <a:p>
-            <a:endParaRPr lang="en-GB" dirty="0"/>
-          </a:p>
-        </p:txBody>
-      </p:sp>
-    </p:spTree>
-    <p:extLst>
-      <p:ext uri="{BB962C8B-B14F-4D97-AF65-F5344CB8AC3E}">
-        <p14:creationId xmlns:p14="http://schemas.microsoft.com/office/powerpoint/2010/main" val="1876525649"/>
-      </p:ext>
-    </p:extLst>
-  </p:cSld>
-  <p:clrMapOvr>
-    <a:masterClrMapping/>
-  </p:clrMapOvr>
-</p:sld>
-</file>
-
-<file path=ppt/slides/slide17.xml><?xml version="1.0" encoding="utf-8"?>
-<p:sld xmlns:a="http://schemas.openxmlformats.org/drawingml/2006/main" xmlns:r="http://schemas.openxmlformats.org/officeDocument/2006/relationships" xmlns:p="http://schemas.openxmlformats.org/presentationml/2006/main">
-  <p:cSld>
-    <p:spTree>
-      <p:nvGrpSpPr>
-        <p:cNvPr id="1" name=""/>
-        <p:cNvGrpSpPr/>
-        <p:nvPr/>
-      </p:nvGrpSpPr>
-      <p:grpSpPr>
-        <a:xfrm>
-          <a:off x="0" y="0"/>
-          <a:ext cx="0" cy="0"/>
-          <a:chOff x="0" y="0"/>
-          <a:chExt cx="0" cy="0"/>
-        </a:xfrm>
-      </p:grpSpPr>
-      <p:sp>
-        <p:nvSpPr>
-          <p:cNvPr id="2" name="Titel 1"/>
-          <p:cNvSpPr>
-            <a:spLocks noGrp="1"/>
-          </p:cNvSpPr>
-          <p:nvPr>
-            <p:ph type="title"/>
-          </p:nvPr>
-        </p:nvSpPr>
-        <p:spPr/>
-        <p:txBody>
-          <a:bodyPr/>
-          <a:lstStyle/>
-          <a:p>
-            <a:r>
-              <a:rPr lang="en-GB" dirty="0" smtClean="0"/>
-              <a:t>(Alternative </a:t>
-            </a:r>
-            <a:r>
-              <a:rPr lang="en-GB" dirty="0" err="1" smtClean="0"/>
-              <a:t>zu</a:t>
-            </a:r>
-            <a:r>
-              <a:rPr lang="en-GB" dirty="0" smtClean="0"/>
-              <a:t> </a:t>
-            </a:r>
-            <a:r>
-              <a:rPr lang="en-GB" dirty="0" err="1" smtClean="0"/>
-              <a:t>Folie</a:t>
-            </a:r>
-            <a:r>
-              <a:rPr lang="en-GB" dirty="0" smtClean="0"/>
-              <a:t> 2)</a:t>
-            </a:r>
-            <a:br>
-              <a:rPr lang="en-GB" dirty="0" smtClean="0"/>
-            </a:br>
-            <a:r>
-              <a:rPr lang="en-GB" dirty="0" smtClean="0"/>
-              <a:t>Image </a:t>
-            </a:r>
-            <a:r>
-              <a:rPr lang="en-GB" dirty="0"/>
-              <a:t>reconstruction </a:t>
-            </a:r>
-            <a:r>
-              <a:rPr lang="en-GB" dirty="0" smtClean="0"/>
-              <a:t>problem</a:t>
-            </a:r>
-            <a:endParaRPr lang="en-GB" dirty="0"/>
-          </a:p>
-        </p:txBody>
-      </p:sp>
-      <p:sp>
-        <p:nvSpPr>
-          <p:cNvPr id="3" name="Inhaltsplatzhalter 2"/>
-          <p:cNvSpPr>
-            <a:spLocks noGrp="1"/>
-          </p:cNvSpPr>
-          <p:nvPr>
-            <p:ph idx="1"/>
-          </p:nvPr>
-        </p:nvSpPr>
-        <p:spPr/>
-        <p:txBody>
-          <a:bodyPr/>
-          <a:lstStyle/>
-          <a:p>
-            <a:endParaRPr lang="en-GB" dirty="0"/>
-          </a:p>
-        </p:txBody>
-      </p:sp>
-      <p:pic>
-        <p:nvPicPr>
-          <p:cNvPr id="4" name="Grafik 3"/>
-          <p:cNvPicPr>
-            <a:picLocks noChangeAspect="1"/>
-          </p:cNvPicPr>
-          <p:nvPr/>
-        </p:nvPicPr>
-        <p:blipFill>
-          <a:blip r:embed="rId2"/>
-          <a:stretch>
-            <a:fillRect/>
-          </a:stretch>
-        </p:blipFill>
-        <p:spPr>
-          <a:xfrm>
-            <a:off x="431875" y="4172333"/>
-            <a:ext cx="11328250" cy="2767393"/>
-          </a:xfrm>
-          <a:prstGeom prst="rect">
-            <a:avLst/>
-          </a:prstGeom>
-        </p:spPr>
-      </p:pic>
-      <p:pic>
-        <p:nvPicPr>
-          <p:cNvPr id="5" name="Inhaltsplatzhalter 6"/>
-          <p:cNvPicPr>
-            <a:picLocks noChangeAspect="1"/>
-          </p:cNvPicPr>
-          <p:nvPr/>
-        </p:nvPicPr>
-        <p:blipFill>
-          <a:blip r:embed="rId3" cstate="print">
-            <a:extLst>
-              <a:ext uri="{28A0092B-C50C-407E-A947-70E740481C1C}">
-                <a14:useLocalDpi xmlns:a14="http://schemas.microsoft.com/office/drawing/2010/main" val="0"/>
-              </a:ext>
-            </a:extLst>
-          </a:blip>
-          <a:stretch>
-            <a:fillRect/>
-          </a:stretch>
-        </p:blipFill>
-        <p:spPr>
-          <a:xfrm>
-            <a:off x="26019" y="2044807"/>
-            <a:ext cx="2132565" cy="2114644"/>
-          </a:xfrm>
-          <a:prstGeom prst="rect">
-            <a:avLst/>
-          </a:prstGeom>
-        </p:spPr>
-      </p:pic>
-      <p:pic>
-        <p:nvPicPr>
-          <p:cNvPr id="6" name="Grafik 5"/>
-          <p:cNvPicPr>
-            <a:picLocks noChangeAspect="1"/>
-          </p:cNvPicPr>
-          <p:nvPr/>
-        </p:nvPicPr>
-        <p:blipFill rotWithShape="1">
-          <a:blip r:embed="rId4" cstate="print">
-            <a:extLst>
-              <a:ext uri="{28A0092B-C50C-407E-A947-70E740481C1C}">
-                <a14:useLocalDpi xmlns:a14="http://schemas.microsoft.com/office/drawing/2010/main" val="0"/>
-              </a:ext>
-            </a:extLst>
-          </a:blip>
-          <a:srcRect l="13804" t="5129" b="8461"/>
-          <a:stretch/>
-        </p:blipFill>
-        <p:spPr>
-          <a:xfrm>
-            <a:off x="9881966" y="1928130"/>
-            <a:ext cx="2310033" cy="2244203"/>
-          </a:xfrm>
-          <a:prstGeom prst="rect">
-            <a:avLst/>
-          </a:prstGeom>
-        </p:spPr>
-      </p:pic>
-      <p:sp>
-        <p:nvSpPr>
-          <p:cNvPr id="7" name="Textfeld 6"/>
-          <p:cNvSpPr txBox="1"/>
-          <p:nvPr/>
-        </p:nvSpPr>
-        <p:spPr>
-          <a:xfrm>
-            <a:off x="121015" y="1636915"/>
-            <a:ext cx="2147777" cy="461665"/>
-          </a:xfrm>
-          <a:prstGeom prst="rect">
-            <a:avLst/>
-          </a:prstGeom>
-          <a:noFill/>
-        </p:spPr>
-        <p:txBody>
-          <a:bodyPr wrap="square" rtlCol="0">
-            <a:spAutoFit/>
-          </a:bodyPr>
-          <a:lstStyle/>
-          <a:p>
-            <a:r>
-              <a:rPr lang="en-GB" sz="2400" dirty="0" smtClean="0"/>
-              <a:t>Fourier space</a:t>
-            </a:r>
-            <a:endParaRPr lang="en-GB" sz="2400" dirty="0"/>
-          </a:p>
-        </p:txBody>
-      </p:sp>
-      <p:sp>
-        <p:nvSpPr>
-          <p:cNvPr id="8" name="Textfeld 7"/>
-          <p:cNvSpPr txBox="1"/>
-          <p:nvPr/>
-        </p:nvSpPr>
-        <p:spPr>
-          <a:xfrm>
-            <a:off x="10279911" y="1466465"/>
-            <a:ext cx="2147777" cy="461665"/>
-          </a:xfrm>
-          <a:prstGeom prst="rect">
-            <a:avLst/>
-          </a:prstGeom>
-          <a:noFill/>
-        </p:spPr>
-        <p:txBody>
-          <a:bodyPr wrap="square" rtlCol="0">
-            <a:spAutoFit/>
-          </a:bodyPr>
-          <a:lstStyle/>
-          <a:p>
-            <a:r>
-              <a:rPr lang="en-GB" sz="2400" dirty="0" smtClean="0"/>
-              <a:t>Image space</a:t>
-            </a:r>
-            <a:endParaRPr lang="en-GB" sz="2400" dirty="0"/>
-          </a:p>
-        </p:txBody>
-      </p:sp>
-    </p:spTree>
-    <p:extLst>
-      <p:ext uri="{BB962C8B-B14F-4D97-AF65-F5344CB8AC3E}">
-        <p14:creationId xmlns:p14="http://schemas.microsoft.com/office/powerpoint/2010/main" val="3661638364"/>
-      </p:ext>
-    </p:extLst>
-  </p:cSld>
-  <p:clrMapOvr>
-    <a:masterClrMapping/>
-  </p:clrMapOvr>
-</p:sld>
-</file>
-
-<file path=ppt/slides/slide18.xml><?xml version="1.0" encoding="utf-8"?>
-<p:sld xmlns:a="http://schemas.openxmlformats.org/drawingml/2006/main" xmlns:r="http://schemas.openxmlformats.org/officeDocument/2006/relationships" xmlns:p="http://schemas.openxmlformats.org/presentationml/2006/main">
-  <p:cSld>
-    <p:spTree>
-      <p:nvGrpSpPr>
-        <p:cNvPr id="1" name=""/>
-        <p:cNvGrpSpPr/>
-        <p:nvPr/>
-      </p:nvGrpSpPr>
-      <p:grpSpPr>
-        <a:xfrm>
-          <a:off x="0" y="0"/>
-          <a:ext cx="0" cy="0"/>
-          <a:chOff x="0" y="0"/>
-          <a:chExt cx="0" cy="0"/>
-        </a:xfrm>
-      </p:grpSpPr>
-      <p:sp>
-        <p:nvSpPr>
-          <p:cNvPr id="2" name="Titel 1"/>
-          <p:cNvSpPr>
-            <a:spLocks noGrp="1"/>
-          </p:cNvSpPr>
-          <p:nvPr>
-            <p:ph type="title"/>
-          </p:nvPr>
-        </p:nvSpPr>
-        <p:spPr/>
-        <p:txBody>
-          <a:bodyPr/>
-          <a:lstStyle/>
-          <a:p>
-            <a:r>
-              <a:rPr lang="en-GB" dirty="0" smtClean="0"/>
-              <a:t>Comparison CLEAN with </a:t>
-            </a:r>
-            <a:r>
-              <a:rPr lang="en-GB" dirty="0" err="1" smtClean="0"/>
-              <a:t>CD+ElasticNet</a:t>
-            </a:r>
-            <a:endParaRPr lang="en-GB" dirty="0"/>
-          </a:p>
-        </p:txBody>
-      </p:sp>
-      <p:sp>
-        <p:nvSpPr>
-          <p:cNvPr id="3" name="Inhaltsplatzhalter 2"/>
-          <p:cNvSpPr>
-            <a:spLocks noGrp="1"/>
-          </p:cNvSpPr>
-          <p:nvPr>
-            <p:ph idx="1"/>
-          </p:nvPr>
-        </p:nvSpPr>
-        <p:spPr/>
-        <p:txBody>
-          <a:bodyPr/>
-          <a:lstStyle/>
-          <a:p>
-            <a:endParaRPr lang="en-GB" dirty="0" smtClean="0"/>
-          </a:p>
-          <a:p>
-            <a:endParaRPr lang="en-GB" dirty="0"/>
-          </a:p>
-          <a:p>
-            <a:endParaRPr lang="en-GB" dirty="0" smtClean="0"/>
-          </a:p>
-          <a:p>
-            <a:endParaRPr lang="en-GB" dirty="0"/>
-          </a:p>
-          <a:p>
-            <a:r>
-              <a:rPr lang="en-GB" dirty="0" smtClean="0"/>
-              <a:t>Noise Regularization:</a:t>
-            </a:r>
-          </a:p>
-          <a:p>
-            <a:pPr marL="0" indent="0">
-              <a:buNone/>
-            </a:pPr>
-            <a:r>
-              <a:rPr lang="en-GB" dirty="0" err="1" smtClean="0"/>
-              <a:t>ElasticNet</a:t>
+              <a:t>ElasticNET</a:t>
             </a:r>
             <a:endParaRPr lang="en-GB" dirty="0"/>
           </a:p>
@@ -7204,7 +6709,7 @@
         </p:blipFill>
         <p:spPr>
           <a:xfrm>
-            <a:off x="9012387" y="3850414"/>
+            <a:off x="6638464" y="3183346"/>
             <a:ext cx="2993617" cy="2993617"/>
           </a:xfrm>
           <a:prstGeom prst="rect">
@@ -7234,7 +6739,7 @@
         </p:blipFill>
         <p:spPr>
           <a:xfrm>
-            <a:off x="4753965" y="3850414"/>
+            <a:off x="2380042" y="3183346"/>
             <a:ext cx="2993199" cy="2993199"/>
           </a:xfrm>
           <a:prstGeom prst="rect">
@@ -7250,7 +6755,7 @@
         </p:nvSpPr>
         <p:spPr>
           <a:xfrm>
-            <a:off x="5815371" y="3481082"/>
+            <a:off x="3441448" y="2814014"/>
             <a:ext cx="1004599" cy="369332"/>
           </a:xfrm>
           <a:prstGeom prst="rect">
@@ -7280,7 +6785,7 @@
         </p:nvSpPr>
         <p:spPr>
           <a:xfrm>
-            <a:off x="10013823" y="3481082"/>
+            <a:off x="7639900" y="2814014"/>
             <a:ext cx="990744" cy="369332"/>
           </a:xfrm>
           <a:prstGeom prst="rect">
@@ -7310,7 +6815,7 @@
         </p:nvSpPr>
         <p:spPr>
           <a:xfrm>
-            <a:off x="7980467" y="4488031"/>
+            <a:off x="5696691" y="3705515"/>
             <a:ext cx="798617" cy="1569660"/>
           </a:xfrm>
           <a:prstGeom prst="rect">
@@ -7342,10 +6847,17 @@
   <p:clrMapOvr>
     <a:masterClrMapping/>
   </p:clrMapOvr>
+  <p:timing>
+    <p:tnLst>
+      <p:par>
+        <p:cTn id="1" dur="indefinite" restart="never" nodeType="tmRoot"/>
+      </p:par>
+    </p:tnLst>
+  </p:timing>
 </p:sld>
 </file>
 
-<file path=ppt/slides/slide19.xml><?xml version="1.0" encoding="utf-8"?>
+<file path=ppt/slides/slide16.xml><?xml version="1.0" encoding="utf-8"?>
 <p:sld xmlns:a="http://schemas.openxmlformats.org/drawingml/2006/main" xmlns:r="http://schemas.openxmlformats.org/officeDocument/2006/relationships" xmlns:p="http://schemas.openxmlformats.org/presentationml/2006/main">
   <p:cSld>
     <p:bg>
@@ -7401,57 +6913,121 @@
           </a:p>
         </p:txBody>
       </p:sp>
-      <p:sp>
-        <p:nvSpPr>
-          <p:cNvPr id="3" name="Inhaltsplatzhalter 2"/>
-          <p:cNvSpPr>
-            <a:spLocks noGrp="1"/>
-          </p:cNvSpPr>
-          <p:nvPr>
-            <p:ph idx="1"/>
-          </p:nvPr>
-        </p:nvSpPr>
-        <p:spPr/>
-        <p:txBody>
-          <a:bodyPr/>
-          <a:lstStyle/>
-          <a:p>
-            <a:endParaRPr lang="en-GB" dirty="0"/>
-          </a:p>
-        </p:txBody>
-      </p:sp>
       <p:pic>
         <p:nvPicPr>
-          <p:cNvPr id="9" name="Grafik 8"/>
+          <p:cNvPr id="5" name="Inhaltsplatzhalter 4"/>
           <p:cNvPicPr>
-            <a:picLocks noChangeAspect="1"/>
+            <a:picLocks noGrp="1" noChangeAspect="1"/>
           </p:cNvPicPr>
-          <p:nvPr/>
+          <p:nvPr>
+            <p:ph idx="1"/>
+          </p:nvPr>
         </p:nvPicPr>
         <p:blipFill rotWithShape="1">
-          <a:blip r:embed="rId2">
+          <a:blip r:embed="rId2" cstate="print">
             <a:extLst>
               <a:ext uri="{28A0092B-C50C-407E-A947-70E740481C1C}">
                 <a14:useLocalDpi xmlns:a14="http://schemas.microsoft.com/office/drawing/2010/main" val="0"/>
               </a:ext>
             </a:extLst>
           </a:blip>
-          <a:srcRect l="5849" t="7514" r="37960" b="40839"/>
+          <a:srcRect t="8351" r="4079" b="10655"/>
           <a:stretch/>
         </p:blipFill>
         <p:spPr>
           <a:xfrm>
-            <a:off x="1311038" y="2075202"/>
-            <a:ext cx="3743422" cy="3440704"/>
+            <a:off x="297812" y="2245074"/>
+            <a:ext cx="5482713" cy="4595526"/>
+          </a:xfrm>
+        </p:spPr>
+      </p:pic>
+      <p:sp>
+        <p:nvSpPr>
+          <p:cNvPr id="4" name="Textfeld 3"/>
+          <p:cNvSpPr txBox="1"/>
+          <p:nvPr/>
+        </p:nvSpPr>
+        <p:spPr>
+          <a:xfrm>
+            <a:off x="2706985" y="1809723"/>
+            <a:ext cx="797719" cy="369332"/>
           </a:xfrm>
           <a:prstGeom prst="rect">
             <a:avLst/>
           </a:prstGeom>
+          <a:noFill/>
         </p:spPr>
-      </p:pic>
+        <p:txBody>
+          <a:bodyPr wrap="none" rtlCol="0">
+            <a:spAutoFit/>
+          </a:bodyPr>
+          <a:lstStyle/>
+          <a:p>
+            <a:r>
+              <a:rPr lang="en-GB" dirty="0" smtClean="0">
+                <a:solidFill>
+                  <a:schemeClr val="bg1"/>
+                </a:solidFill>
+              </a:rPr>
+              <a:t>CLEAN</a:t>
+            </a:r>
+            <a:endParaRPr lang="en-GB" dirty="0">
+              <a:solidFill>
+                <a:schemeClr val="bg1"/>
+              </a:solidFill>
+            </a:endParaRPr>
+          </a:p>
+        </p:txBody>
+      </p:sp>
+      <p:sp>
+        <p:nvSpPr>
+          <p:cNvPr id="11" name="Textfeld 10"/>
+          <p:cNvSpPr txBox="1"/>
+          <p:nvPr/>
+        </p:nvSpPr>
+        <p:spPr>
+          <a:xfrm>
+            <a:off x="8185546" y="1809723"/>
+            <a:ext cx="1636025" cy="369332"/>
+          </a:xfrm>
+          <a:prstGeom prst="rect">
+            <a:avLst/>
+          </a:prstGeom>
+          <a:noFill/>
+        </p:spPr>
+        <p:txBody>
+          <a:bodyPr wrap="none" rtlCol="0">
+            <a:spAutoFit/>
+          </a:bodyPr>
+          <a:lstStyle/>
+          <a:p>
+            <a:r>
+              <a:rPr lang="en-GB" dirty="0" smtClean="0">
+                <a:solidFill>
+                  <a:schemeClr val="bg1"/>
+                </a:solidFill>
+              </a:rPr>
+              <a:t>CD + </a:t>
+            </a:r>
+            <a:r>
+              <a:rPr lang="en-GB" dirty="0" err="1" smtClean="0">
+                <a:solidFill>
+                  <a:schemeClr val="bg1"/>
+                </a:solidFill>
+              </a:rPr>
+              <a:t>ElasticNET</a:t>
+            </a:r>
+            <a:endParaRPr lang="en-GB" dirty="0">
+              <a:solidFill>
+                <a:schemeClr val="bg1"/>
+              </a:solidFill>
+            </a:endParaRPr>
+          </a:p>
+        </p:txBody>
+      </p:sp>
       <p:pic>
         <p:nvPicPr>
-          <p:cNvPr id="10" name="Inhaltsplatzhalter 3"/>
+          <p:cNvPr id="6" name="Grafik 5"/>
           <p:cNvPicPr>
             <a:picLocks noChangeAspect="1"/>
           </p:cNvPicPr>
@@ -7465,103 +7041,19 @@
               </a:ext>
             </a:extLst>
           </a:blip>
-          <a:srcRect l="9589" t="8669" r="41896" b="43804"/>
+          <a:srcRect l="9741" t="8750" r="4503" b="12638"/>
           <a:stretch/>
         </p:blipFill>
         <p:spPr>
           <a:xfrm>
-            <a:off x="6636145" y="2133956"/>
-            <a:ext cx="3452291" cy="3381950"/>
+            <a:off x="6144107" y="2245074"/>
+            <a:ext cx="4933957" cy="4489742"/>
           </a:xfrm>
           <a:prstGeom prst="rect">
             <a:avLst/>
           </a:prstGeom>
         </p:spPr>
       </p:pic>
-      <p:sp>
-        <p:nvSpPr>
-          <p:cNvPr id="4" name="Textfeld 3"/>
-          <p:cNvSpPr txBox="1"/>
-          <p:nvPr/>
-        </p:nvSpPr>
-        <p:spPr>
-          <a:xfrm>
-            <a:off x="2783889" y="1993872"/>
-            <a:ext cx="797719" cy="369332"/>
-          </a:xfrm>
-          <a:prstGeom prst="rect">
-            <a:avLst/>
-          </a:prstGeom>
-          <a:noFill/>
-        </p:spPr>
-        <p:txBody>
-          <a:bodyPr wrap="none" rtlCol="0">
-            <a:spAutoFit/>
-          </a:bodyPr>
-          <a:lstStyle/>
-          <a:p>
-            <a:r>
-              <a:rPr lang="en-GB" dirty="0" smtClean="0">
-                <a:solidFill>
-                  <a:schemeClr val="bg1"/>
-                </a:solidFill>
-              </a:rPr>
-              <a:t>CLEAN</a:t>
-            </a:r>
-            <a:endParaRPr lang="en-GB" dirty="0">
-              <a:solidFill>
-                <a:schemeClr val="bg1"/>
-              </a:solidFill>
-            </a:endParaRPr>
-          </a:p>
-        </p:txBody>
-      </p:sp>
-      <p:sp>
-        <p:nvSpPr>
-          <p:cNvPr id="11" name="Textfeld 10"/>
-          <p:cNvSpPr txBox="1"/>
-          <p:nvPr/>
-        </p:nvSpPr>
-        <p:spPr>
-          <a:xfrm>
-            <a:off x="7242571" y="1823068"/>
-            <a:ext cx="2737031" cy="369332"/>
-          </a:xfrm>
-          <a:prstGeom prst="rect">
-            <a:avLst/>
-          </a:prstGeom>
-          <a:noFill/>
-        </p:spPr>
-        <p:txBody>
-          <a:bodyPr wrap="none" rtlCol="0">
-            <a:spAutoFit/>
-          </a:bodyPr>
-          <a:lstStyle/>
-          <a:p>
-            <a:r>
-              <a:rPr lang="en-GB" dirty="0" smtClean="0">
-                <a:solidFill>
-                  <a:schemeClr val="bg1"/>
-                </a:solidFill>
-              </a:rPr>
-              <a:t>Distributed CD + </a:t>
-            </a:r>
-            <a:r>
-              <a:rPr lang="en-GB" dirty="0" err="1" smtClean="0">
-                <a:solidFill>
-                  <a:schemeClr val="bg1"/>
-                </a:solidFill>
-              </a:rPr>
-              <a:t>ElasticNET</a:t>
-            </a:r>
-            <a:endParaRPr lang="en-GB" dirty="0">
-              <a:solidFill>
-                <a:schemeClr val="bg1"/>
-              </a:solidFill>
-            </a:endParaRPr>
-          </a:p>
-        </p:txBody>
-      </p:sp>
     </p:spTree>
     <p:extLst>
       <p:ext uri="{BB962C8B-B14F-4D97-AF65-F5344CB8AC3E}">
@@ -7939,12 +7431,6 @@
           <a:p>
             <a:r>
               <a:rPr lang="en-GB" dirty="0" smtClean="0"/>
-              <a:t>Hardware: 4 Linux nodes, 1 CPU each</a:t>
-            </a:r>
-          </a:p>
-          <a:p>
-            <a:r>
-              <a:rPr lang="en-GB" dirty="0" smtClean="0"/>
               <a:t>Implementation: .</a:t>
             </a:r>
             <a:r>
@@ -7964,12 +7450,30 @@
           </a:p>
           <a:p>
             <a:r>
+              <a:rPr lang="en-GB" dirty="0"/>
+              <a:t>Hardware: 4 Linux nodes, 1 CPU </a:t>
+            </a:r>
+            <a:r>
               <a:rPr lang="en-GB" dirty="0" smtClean="0"/>
-              <a:t>Tested </a:t>
-            </a:r>
+              <a:t>each</a:t>
+            </a:r>
+          </a:p>
+          <a:p>
             <a:r>
               <a:rPr lang="en-GB" dirty="0"/>
-              <a:t>speedup on 1GB real-world </a:t>
+              <a:t>S</a:t>
+            </a:r>
+            <a:r>
+              <a:rPr lang="en-GB" dirty="0" smtClean="0"/>
+              <a:t>peedup </a:t>
+            </a:r>
+            <a:r>
+              <a:rPr lang="en-GB" dirty="0"/>
+              <a:t>on 1GB </a:t>
+            </a:r>
+            <a:r>
+              <a:rPr lang="en-GB" dirty="0" smtClean="0"/>
+              <a:t>LMC </a:t>
             </a:r>
             <a:r>
               <a:rPr lang="en-GB" dirty="0" err="1"/>
@@ -7984,9 +7488,9 @@
             <a:endParaRPr lang="en-GB" dirty="0" smtClean="0"/>
           </a:p>
           <a:p>
-            <a:endParaRPr lang="en-GB" dirty="0" smtClean="0"/>
-          </a:p>
-          <a:p>
+            <a:pPr marL="0" indent="0">
+              <a:buNone/>
+            </a:pPr>
             <a:endParaRPr lang="en-GB" dirty="0"/>
           </a:p>
           <a:p>
@@ -8113,6 +7617,9 @@
           </a:bodyPr>
           <a:lstStyle/>
           <a:p>
+            <a:pPr marL="0" indent="0">
+              <a:buNone/>
+            </a:pPr>
             <a:r>
               <a:rPr lang="en-GB" sz="2000" dirty="0" err="1"/>
               <a:t>Veenboer</a:t>
@@ -8167,27 +7674,6 @@
               </a:rPr>
               <a:t>.</a:t>
             </a:r>
-          </a:p>
-          <a:p>
-            <a:r>
-              <a:rPr lang="en-GB" sz="2000" dirty="0" smtClean="0"/>
-              <a:t>GPU implementations exist</a:t>
-            </a:r>
-          </a:p>
-          <a:p>
-            <a:r>
-              <a:rPr lang="en-GB" sz="2000" dirty="0" smtClean="0"/>
-              <a:t>.</a:t>
-            </a:r>
-            <a:r>
-              <a:rPr lang="en-GB" sz="2000" dirty="0" err="1" smtClean="0"/>
-              <a:t>netcore</a:t>
-            </a:r>
-            <a:r>
-              <a:rPr lang="en-GB" sz="2000" dirty="0" smtClean="0"/>
-              <a:t> so far uses the CPU</a:t>
-            </a:r>
-            <a:endParaRPr lang="en-GB" sz="2000" dirty="0"/>
           </a:p>
         </p:txBody>
       </p:sp>
@@ -8540,7 +8026,7 @@
         </p:blipFill>
         <p:spPr>
           <a:xfrm>
-            <a:off x="5249365" y="1737745"/>
+            <a:off x="5249365" y="1755329"/>
             <a:ext cx="712993" cy="712993"/>
           </a:xfrm>
         </p:spPr>
@@ -8824,21 +8310,21 @@
       </p:sp>
       <p:graphicFrame>
         <p:nvGraphicFramePr>
-          <p:cNvPr id="6" name="Diagramm 5"/>
+          <p:cNvPr id="5" name="Diagramm 4"/>
           <p:cNvGraphicFramePr>
             <a:graphicFrameLocks/>
           </p:cNvGraphicFramePr>
           <p:nvPr>
             <p:extLst>
               <p:ext uri="{D42A27DB-BD31-4B8C-83A1-F6EECF244321}">
-                <p14:modId xmlns:p14="http://schemas.microsoft.com/office/powerpoint/2010/main" val="2241446028"/>
+                <p14:modId xmlns:p14="http://schemas.microsoft.com/office/powerpoint/2010/main" val="1065447057"/>
               </p:ext>
             </p:extLst>
           </p:nvPr>
         </p:nvGraphicFramePr>
         <p:xfrm>
-          <a:off x="1784968" y="1690688"/>
-          <a:ext cx="8273432" cy="4760048"/>
+          <a:off x="2092461" y="1554255"/>
+          <a:ext cx="8220916" cy="4688283"/>
         </p:xfrm>
         <a:graphic>
           <a:graphicData uri="http://schemas.openxmlformats.org/drawingml/2006/chart">
@@ -9038,7 +8524,7 @@
           <a:p>
             <a:r>
               <a:rPr lang="en-GB" dirty="0" smtClean="0"/>
-              <a:t>Distributed algorithms</a:t>
+              <a:t>Methods for distributed deconvolution</a:t>
             </a:r>
             <a:endParaRPr lang="en-GB" dirty="0"/>
           </a:p>
@@ -9057,7 +8543,7 @@
         <p:spPr/>
         <p:txBody>
           <a:bodyPr>
-            <a:normAutofit fontScale="85000" lnSpcReduction="20000"/>
+            <a:normAutofit fontScale="77500" lnSpcReduction="20000"/>
           </a:bodyPr>
           <a:lstStyle/>
           <a:p>
@@ -9067,7 +8553,7 @@
             </a:r>
             <a:r>
               <a:rPr lang="en-GB" dirty="0" smtClean="0"/>
-              <a:t>variants in Radio Astronomy</a:t>
+              <a:t>methods in Radio Astronomy</a:t>
             </a:r>
             <a:endParaRPr lang="en-GB" dirty="0"/>
           </a:p>
@@ -9149,70 +8635,13 @@
           <a:p>
             <a:r>
               <a:rPr lang="en-GB" dirty="0" smtClean="0"/>
-              <a:t>Coordinate Descent variants</a:t>
+              <a:t>Coordinate Descent methods in Signal Processing</a:t>
             </a:r>
           </a:p>
           <a:p>
             <a:pPr lvl="1"/>
             <a:r>
-              <a:rPr lang="en-GB" dirty="0"/>
-              <a:t>Bradley, Joseph K., et al. "Parallel coordinate descent for l1-regularized loss minimization."</a:t>
-            </a:r>
-            <a:r>
-              <a:rPr lang="en-GB" dirty="0">
-                <a:solidFill>
-                  <a:schemeClr val="bg1">
-                    <a:lumMod val="50000"/>
-                  </a:schemeClr>
-                </a:solidFill>
-              </a:rPr>
-              <a:t> </a:t>
-            </a:r>
-            <a:r>
-              <a:rPr lang="en-GB" i="1" dirty="0" err="1">
-                <a:solidFill>
-                  <a:schemeClr val="bg1">
-                    <a:lumMod val="50000"/>
-                  </a:schemeClr>
-                </a:solidFill>
-              </a:rPr>
-              <a:t>arXiv</a:t>
-            </a:r>
-            <a:r>
-              <a:rPr lang="en-GB" i="1" dirty="0">
-                <a:solidFill>
-                  <a:schemeClr val="bg1">
-                    <a:lumMod val="50000"/>
-                  </a:schemeClr>
-                </a:solidFill>
-              </a:rPr>
-              <a:t> preprint arXiv:1105.5379</a:t>
-            </a:r>
-            <a:r>
-              <a:rPr lang="en-GB" dirty="0">
-                <a:solidFill>
-                  <a:schemeClr val="bg1">
-                    <a:lumMod val="50000"/>
-                  </a:schemeClr>
-                </a:solidFill>
-              </a:rPr>
-              <a:t>(2011</a:t>
-            </a:r>
-            <a:r>
-              <a:rPr lang="en-GB" dirty="0" smtClean="0">
-                <a:solidFill>
-                  <a:schemeClr val="bg1">
-                    <a:lumMod val="50000"/>
-                  </a:schemeClr>
-                </a:solidFill>
-              </a:rPr>
-              <a:t>).</a:t>
-            </a:r>
-          </a:p>
-          <a:p>
-            <a:pPr lvl="1"/>
-            <a:r>
-              <a:rPr lang="en-GB" dirty="0" err="1"/>
+              <a:rPr lang="en-GB" dirty="0" err="1" smtClean="0"/>
               <a:t>Fercoq</a:t>
             </a:r>
             <a:r>
@@ -9247,9 +8676,65 @@
           <a:p>
             <a:pPr lvl="1"/>
             <a:r>
+              <a:rPr lang="en-GB" dirty="0"/>
+              <a:t>Felix, Simon, Roman </a:t>
+            </a:r>
+            <a:r>
+              <a:rPr lang="en-GB" dirty="0" err="1"/>
+              <a:t>Bolzern</a:t>
+            </a:r>
+            <a:r>
+              <a:rPr lang="en-GB" dirty="0"/>
+              <a:t>, and Marina </a:t>
+            </a:r>
+            <a:r>
+              <a:rPr lang="en-GB" dirty="0" err="1"/>
+              <a:t>Battaglia</a:t>
+            </a:r>
+            <a:r>
+              <a:rPr lang="en-GB" dirty="0"/>
+              <a:t>. "A compressed sensing-based image reconstruction algorithm for solar flare X-ray observations." </a:t>
+            </a:r>
+            <a:r>
+              <a:rPr lang="en-GB" i="1" dirty="0">
+                <a:solidFill>
+                  <a:schemeClr val="bg1">
+                    <a:lumMod val="50000"/>
+                  </a:schemeClr>
+                </a:solidFill>
+              </a:rPr>
+              <a:t>The Astrophysical Journal</a:t>
+            </a:r>
+            <a:r>
+              <a:rPr lang="en-GB" dirty="0">
+                <a:solidFill>
+                  <a:schemeClr val="bg1">
+                    <a:lumMod val="50000"/>
+                  </a:schemeClr>
+                </a:solidFill>
+              </a:rPr>
+              <a:t>849.1 (2017): 10.</a:t>
+            </a:r>
+            <a:endParaRPr lang="en-GB" dirty="0" smtClean="0">
+              <a:solidFill>
+                <a:schemeClr val="bg1">
+                  <a:lumMod val="50000"/>
+                </a:schemeClr>
+              </a:solidFill>
+            </a:endParaRPr>
+          </a:p>
+          <a:p>
+            <a:pPr lvl="1"/>
+            <a:r>
               <a:rPr lang="en-GB" dirty="0" smtClean="0"/>
               <a:t>…</a:t>
             </a:r>
+          </a:p>
+          <a:p>
+            <a:pPr marL="457200" lvl="1" indent="0">
+              <a:buNone/>
+            </a:pPr>
+            <a:endParaRPr lang="en-GB" dirty="0" smtClean="0"/>
           </a:p>
         </p:txBody>
       </p:sp>

</xml_diff>

<commit_message>
Hard rework of intro
</commit_message>
<xml_diff>
--- a/SKA-Days/pp.pptx
+++ b/SKA-Days/pp.pptx
@@ -2954,7 +2954,7 @@
           <a:p>
             <a:fld id="{9D44239A-C583-499D-A70F-E9EF0D5B777A}" type="datetimeFigureOut">
               <a:rPr lang="en-GB" smtClean="0"/>
-              <a:t>19/06/2019</a:t>
+              <a:t>20/06/2019</a:t>
             </a:fld>
             <a:endParaRPr lang="en-GB"/>
           </a:p>
@@ -3124,7 +3124,7 @@
           <a:p>
             <a:fld id="{9D44239A-C583-499D-A70F-E9EF0D5B777A}" type="datetimeFigureOut">
               <a:rPr lang="en-GB" smtClean="0"/>
-              <a:t>19/06/2019</a:t>
+              <a:t>20/06/2019</a:t>
             </a:fld>
             <a:endParaRPr lang="en-GB"/>
           </a:p>
@@ -3304,7 +3304,7 @@
           <a:p>
             <a:fld id="{9D44239A-C583-499D-A70F-E9EF0D5B777A}" type="datetimeFigureOut">
               <a:rPr lang="en-GB" smtClean="0"/>
-              <a:t>19/06/2019</a:t>
+              <a:t>20/06/2019</a:t>
             </a:fld>
             <a:endParaRPr lang="en-GB"/>
           </a:p>
@@ -3474,7 +3474,7 @@
           <a:p>
             <a:fld id="{9D44239A-C583-499D-A70F-E9EF0D5B777A}" type="datetimeFigureOut">
               <a:rPr lang="en-GB" smtClean="0"/>
-              <a:t>19/06/2019</a:t>
+              <a:t>20/06/2019</a:t>
             </a:fld>
             <a:endParaRPr lang="en-GB"/>
           </a:p>
@@ -3720,7 +3720,7 @@
           <a:p>
             <a:fld id="{9D44239A-C583-499D-A70F-E9EF0D5B777A}" type="datetimeFigureOut">
               <a:rPr lang="en-GB" smtClean="0"/>
-              <a:t>19/06/2019</a:t>
+              <a:t>20/06/2019</a:t>
             </a:fld>
             <a:endParaRPr lang="en-GB"/>
           </a:p>
@@ -3952,7 +3952,7 @@
           <a:p>
             <a:fld id="{9D44239A-C583-499D-A70F-E9EF0D5B777A}" type="datetimeFigureOut">
               <a:rPr lang="en-GB" smtClean="0"/>
-              <a:t>19/06/2019</a:t>
+              <a:t>20/06/2019</a:t>
             </a:fld>
             <a:endParaRPr lang="en-GB"/>
           </a:p>
@@ -4319,7 +4319,7 @@
           <a:p>
             <a:fld id="{9D44239A-C583-499D-A70F-E9EF0D5B777A}" type="datetimeFigureOut">
               <a:rPr lang="en-GB" smtClean="0"/>
-              <a:t>19/06/2019</a:t>
+              <a:t>20/06/2019</a:t>
             </a:fld>
             <a:endParaRPr lang="en-GB"/>
           </a:p>
@@ -4437,7 +4437,7 @@
           <a:p>
             <a:fld id="{9D44239A-C583-499D-A70F-E9EF0D5B777A}" type="datetimeFigureOut">
               <a:rPr lang="en-GB" smtClean="0"/>
-              <a:t>19/06/2019</a:t>
+              <a:t>20/06/2019</a:t>
             </a:fld>
             <a:endParaRPr lang="en-GB"/>
           </a:p>
@@ -4532,7 +4532,7 @@
           <a:p>
             <a:fld id="{9D44239A-C583-499D-A70F-E9EF0D5B777A}" type="datetimeFigureOut">
               <a:rPr lang="en-GB" smtClean="0"/>
-              <a:t>19/06/2019</a:t>
+              <a:t>20/06/2019</a:t>
             </a:fld>
             <a:endParaRPr lang="en-GB"/>
           </a:p>
@@ -4809,7 +4809,7 @@
           <a:p>
             <a:fld id="{9D44239A-C583-499D-A70F-E9EF0D5B777A}" type="datetimeFigureOut">
               <a:rPr lang="en-GB" smtClean="0"/>
-              <a:t>19/06/2019</a:t>
+              <a:t>20/06/2019</a:t>
             </a:fld>
             <a:endParaRPr lang="en-GB"/>
           </a:p>
@@ -5062,7 +5062,7 @@
           <a:p>
             <a:fld id="{9D44239A-C583-499D-A70F-E9EF0D5B777A}" type="datetimeFigureOut">
               <a:rPr lang="en-GB" smtClean="0"/>
-              <a:t>19/06/2019</a:t>
+              <a:t>20/06/2019</a:t>
             </a:fld>
             <a:endParaRPr lang="en-GB"/>
           </a:p>
@@ -5275,7 +5275,7 @@
           <a:p>
             <a:fld id="{9D44239A-C583-499D-A70F-E9EF0D5B777A}" type="datetimeFigureOut">
               <a:rPr lang="en-GB" smtClean="0"/>
-              <a:t>19/06/2019</a:t>
+              <a:t>20/06/2019</a:t>
             </a:fld>
             <a:endParaRPr lang="en-GB"/>
           </a:p>
@@ -5846,6 +5846,15 @@
               <a:rPr lang="en-GB" dirty="0" smtClean="0"/>
               <a:t>Search pixel with the value that can be modified the most </a:t>
             </a:r>
+            <a:r>
+              <a:rPr lang="en-GB" dirty="0"/>
+              <a:t>(optimum of a parabola</a:t>
+            </a:r>
+            <a:r>
+              <a:rPr lang="en-GB" dirty="0" smtClean="0"/>
+              <a:t>)</a:t>
+            </a:r>
+            <a:endParaRPr lang="en-GB" dirty="0" smtClean="0"/>
           </a:p>
           <a:p>
             <a:pPr marL="514350" indent="-514350">
@@ -5854,28 +5863,19 @@
             </a:pPr>
             <a:r>
               <a:rPr lang="en-GB" dirty="0" smtClean="0"/>
-              <a:t>Calculate </a:t>
-            </a:r>
-            <a:r>
-              <a:rPr lang="en-GB" dirty="0"/>
-              <a:t>the optimum value for this </a:t>
-            </a:r>
-            <a:r>
-              <a:rPr lang="en-GB" dirty="0" smtClean="0"/>
-              <a:t>pixel independently of all other pixels (optimum </a:t>
-            </a:r>
-            <a:r>
-              <a:rPr lang="en-GB" dirty="0"/>
-              <a:t>of a parabola)</a:t>
-            </a:r>
-          </a:p>
-          <a:p>
-            <a:pPr marL="514350" lvl="0" indent="-514350">
+              <a:t>Optimize maximum pixel</a:t>
+            </a:r>
+            <a:endParaRPr lang="en-GB" i="1" dirty="0">
+              <a:latin typeface="Bell MT" panose="02020503060305020303" pitchFamily="18" charset="0"/>
+            </a:endParaRPr>
+          </a:p>
+          <a:p>
+            <a:pPr marL="514350" indent="-514350">
               <a:buFont typeface="+mj-lt"/>
               <a:buAutoNum type="arabicPeriod"/>
             </a:pPr>
             <a:r>
-              <a:rPr lang="en-GB" dirty="0"/>
+              <a:rPr lang="en-GB" dirty="0" smtClean="0"/>
               <a:t>Update </a:t>
             </a:r>
             <a:r>
@@ -6356,11 +6356,7 @@
             </a:br>
             <a:r>
               <a:rPr lang="en-GB" dirty="0" smtClean="0"/>
-              <a:t>Baseline distributed gridding </a:t>
-            </a:r>
-            <a:r>
-              <a:rPr lang="en-GB" dirty="0" smtClean="0"/>
-              <a:t>+ deconvolution</a:t>
+              <a:t>Baseline distributed gridding + deconvolution</a:t>
             </a:r>
             <a:endParaRPr lang="en-GB" dirty="0"/>
           </a:p>
@@ -6385,11 +6381,7 @@
           <a:p>
             <a:r>
               <a:rPr lang="en-GB" dirty="0" smtClean="0"/>
-              <a:t>Distributed </a:t>
-            </a:r>
-            <a:r>
-              <a:rPr lang="en-GB" dirty="0" smtClean="0"/>
-              <a:t>gridding: More effective with a lot of input data</a:t>
+              <a:t>Distributed gridding: More effective with a lot of input data</a:t>
             </a:r>
           </a:p>
           <a:p>
@@ -6402,11 +6394,11 @@
             <a:pPr lvl="1"/>
             <a:r>
               <a:rPr lang="en-GB" dirty="0" smtClean="0"/>
-              <a:t>We </a:t>
+              <a:t>We have more communication </a:t>
             </a:r>
             <a:r>
               <a:rPr lang="en-GB" dirty="0"/>
-              <a:t>have more communication efficient CD </a:t>
+              <a:t>efficient CD </a:t>
             </a:r>
             <a:r>
               <a:rPr lang="en-GB" dirty="0" smtClean="0"/>

</xml_diff>